<commit_message>
update - Updating files.
</commit_message>
<xml_diff>
--- a/banco/Sistema_Gerenciador_Usuarios.pptx
+++ b/banco/Sistema_Gerenciador_Usuarios.pptx
@@ -3862,6 +3862,47 @@
             <a:pPr lvl="1"/>
             <a:r>
               <a:rPr lang="pt-BR" dirty="0" smtClean="0"/>
+              <a:t>Consulta/Edição de dados </a:t>
+            </a:r>
+            <a:r>
+              <a:rPr lang="pt-BR" dirty="0" smtClean="0"/>
+              <a:t>cadastrais</a:t>
+            </a:r>
+          </a:p>
+          <a:p>
+            <a:pPr lvl="1"/>
+            <a:r>
+              <a:rPr lang="pt-BR" dirty="0" smtClean="0"/>
+              <a:t>Troca de </a:t>
+            </a:r>
+            <a:r>
+              <a:rPr lang="pt-BR" dirty="0" smtClean="0"/>
+              <a:t>senha</a:t>
+            </a:r>
+            <a:endParaRPr lang="pt-BR" dirty="0" smtClean="0"/>
+          </a:p>
+          <a:p>
+            <a:r>
+              <a:rPr lang="pt-BR" dirty="0" smtClean="0"/>
+              <a:t>Administradores</a:t>
+            </a:r>
+          </a:p>
+          <a:p>
+            <a:pPr lvl="1"/>
+            <a:r>
+              <a:rPr lang="pt-BR" dirty="0" smtClean="0"/>
+              <a:t>Cadastro/</a:t>
+            </a:r>
+            <a:r>
+              <a:rPr lang="pt-BR" dirty="0" err="1" smtClean="0"/>
+              <a:t>Login</a:t>
+            </a:r>
+            <a:endParaRPr lang="pt-BR" dirty="0" smtClean="0"/>
+          </a:p>
+          <a:p>
+            <a:pPr lvl="1"/>
+            <a:r>
+              <a:rPr lang="pt-BR" dirty="0" smtClean="0"/>
               <a:t>Consulta/Edição de dados cadastrais</a:t>
             </a:r>
           </a:p>
@@ -3870,47 +3911,6 @@
             <a:r>
               <a:rPr lang="pt-BR" dirty="0" smtClean="0"/>
               <a:t>Troca de senha</a:t>
-            </a:r>
-            <a:endParaRPr lang="pt-BR" dirty="0" smtClean="0"/>
-          </a:p>
-          <a:p>
-            <a:r>
-              <a:rPr lang="pt-BR" dirty="0" smtClean="0"/>
-              <a:t>Administradores</a:t>
-            </a:r>
-          </a:p>
-          <a:p>
-            <a:pPr lvl="1"/>
-            <a:r>
-              <a:rPr lang="pt-BR" dirty="0" smtClean="0"/>
-              <a:t>Cadastro/</a:t>
-            </a:r>
-            <a:r>
-              <a:rPr lang="pt-BR" dirty="0" err="1" smtClean="0"/>
-              <a:t>Login</a:t>
-            </a:r>
-            <a:endParaRPr lang="pt-BR" dirty="0" smtClean="0"/>
-          </a:p>
-          <a:p>
-            <a:pPr lvl="1"/>
-            <a:r>
-              <a:rPr lang="pt-BR" dirty="0" smtClean="0"/>
-              <a:t>Consulta/Edição </a:t>
-            </a:r>
-            <a:r>
-              <a:rPr lang="pt-BR" dirty="0" smtClean="0"/>
-              <a:t>de dados cadastrais</a:t>
-            </a:r>
-          </a:p>
-          <a:p>
-            <a:pPr lvl="1"/>
-            <a:r>
-              <a:rPr lang="pt-BR" dirty="0" smtClean="0"/>
-              <a:t>Troca de </a:t>
-            </a:r>
-            <a:r>
-              <a:rPr lang="pt-BR" dirty="0" smtClean="0"/>
-              <a:t>senha</a:t>
             </a:r>
           </a:p>
           <a:p>
@@ -4014,15 +4014,7 @@
           <a:p>
             <a:r>
               <a:rPr lang="pt-BR" dirty="0" smtClean="0"/>
-              <a:t>Administradores não </a:t>
-            </a:r>
-            <a:r>
-              <a:rPr lang="pt-BR" dirty="0" smtClean="0"/>
-              <a:t>conseguem acessar o Portal de </a:t>
-            </a:r>
-            <a:r>
-              <a:rPr lang="pt-BR" dirty="0" smtClean="0"/>
-              <a:t>Usuários.</a:t>
+              <a:t>Administradores não conseguem acessar o Portal de Usuários.</a:t>
             </a:r>
           </a:p>
           <a:p>
@@ -4199,7 +4191,6 @@
               <a:rPr lang="pt-BR" dirty="0" smtClean="0"/>
               <a:t>Tamanho mínimo/máximo definido em inputs.</a:t>
             </a:r>
-            <a:endParaRPr lang="pt-BR" dirty="0" smtClean="0"/>
           </a:p>
           <a:p>
             <a:r>
@@ -4299,18 +4290,7 @@
                 <a:ea typeface="+mj-ea"/>
                 <a:cs typeface="+mj-cs"/>
               </a:rPr>
-              <a:t>Visite o repositório e demais projetos</a:t>
-            </a:r>
-            <a:r>
-              <a:rPr lang="pt-BR" sz="2800" dirty="0" smtClean="0">
-                <a:solidFill>
-                  <a:schemeClr val="tx1"/>
-                </a:solidFill>
-                <a:latin typeface="+mj-lt"/>
-                <a:ea typeface="+mj-ea"/>
-                <a:cs typeface="+mj-cs"/>
-              </a:rPr>
-              <a:t>:</a:t>
+              <a:t>Visite o repositório e demais projetos:</a:t>
             </a:r>
             <a:endParaRPr lang="pt-BR" dirty="0" smtClean="0"/>
           </a:p>

</xml_diff>

<commit_message>
update - Adding oficial README file.
</commit_message>
<xml_diff>
--- a/banco/Sistema_Gerenciador_Usuarios.pptx
+++ b/banco/Sistema_Gerenciador_Usuarios.pptx
@@ -3862,24 +3862,15 @@
             <a:pPr lvl="1"/>
             <a:r>
               <a:rPr lang="pt-BR" dirty="0" smtClean="0"/>
-              <a:t>Consulta/Edição de dados </a:t>
-            </a:r>
+              <a:t>Consulta/Edição de dados cadastrais</a:t>
+            </a:r>
+          </a:p>
+          <a:p>
+            <a:pPr lvl="1"/>
             <a:r>
               <a:rPr lang="pt-BR" dirty="0" smtClean="0"/>
-              <a:t>cadastrais</a:t>
-            </a:r>
-          </a:p>
-          <a:p>
-            <a:pPr lvl="1"/>
-            <a:r>
-              <a:rPr lang="pt-BR" dirty="0" smtClean="0"/>
-              <a:t>Troca de </a:t>
-            </a:r>
-            <a:r>
-              <a:rPr lang="pt-BR" dirty="0" smtClean="0"/>
-              <a:t>senha</a:t>
-            </a:r>
-            <a:endParaRPr lang="pt-BR" dirty="0" smtClean="0"/>
+              <a:t>Troca de senha</a:t>
+            </a:r>
           </a:p>
           <a:p>
             <a:r>

</xml_diff>